<commit_message>
* final fixes for today
</commit_message>
<xml_diff>
--- a/How-to-Write-A-Paper-Thesis.pptx
+++ b/How-to-Write-A-Paper-Thesis.pptx
@@ -297,7 +297,7 @@
                 <a:spcPct val="100000"/>
               </a:lnSpc>
             </a:pPr>
-            <a:fld id="{D4B5764E-93DB-43B1-9B69-B90A9B5DEF2F}" type="slidenum">
+            <a:fld id="{2E688179-4313-4DDC-AB8D-C8A2DF9FFB76}" type="slidenum">
               <a:rPr b="0" lang="en-US" sz="1800" spc="-1" strike="noStrike">
                 <a:solidFill>
                   <a:srgbClr val="808080"/>
@@ -672,7 +672,7 @@
                 <a:spcPct val="100000"/>
               </a:lnSpc>
             </a:pPr>
-            <a:fld id="{621ACAD5-8007-4081-A54D-621C92FB72F4}" type="slidenum">
+            <a:fld id="{D7980F38-D495-426B-9718-E2C941AD28CF}" type="slidenum">
               <a:rPr b="0" lang="en-US" sz="1800" spc="-1" strike="noStrike">
                 <a:solidFill>
                   <a:srgbClr val="808080"/>
@@ -866,7 +866,7 @@
                 <a:spcPct val="100000"/>
               </a:lnSpc>
             </a:pPr>
-            <a:fld id="{F23E0514-EC75-4D17-8BF7-C9496330E71D}" type="slidenum">
+            <a:fld id="{ECA03274-CF8B-4AC8-BC3B-4667514C98B9}" type="slidenum">
               <a:rPr b="0" lang="en-US" sz="1800" spc="-1" strike="noStrike">
                 <a:solidFill>
                   <a:srgbClr val="808080"/>
@@ -1330,7 +1330,7 @@
                 <a:spcPct val="100000"/>
               </a:lnSpc>
             </a:pPr>
-            <a:fld id="{BD7C2BBD-054A-4390-879E-52280FD2E409}" type="slidenum">
+            <a:fld id="{D4AB4D55-ACEA-4E4D-9DAF-6FB81AE46E21}" type="slidenum">
               <a:rPr b="0" lang="en-US" sz="1800" spc="-1" strike="noStrike">
                 <a:solidFill>
                   <a:srgbClr val="808080"/>
@@ -1925,7 +1925,7 @@
                 <a:spcPct val="100000"/>
               </a:lnSpc>
             </a:pPr>
-            <a:fld id="{4B922E7A-7643-4E9E-8853-E04E03ED0029}" type="slidenum">
+            <a:fld id="{A99FE7C8-FC7C-49DE-99A9-E28566FF96DC}" type="slidenum">
               <a:rPr b="0" lang="en-US" sz="1800" spc="-1" strike="noStrike">
                 <a:solidFill>
                   <a:srgbClr val="808080"/>
@@ -2119,7 +2119,7 @@
                 <a:spcPct val="100000"/>
               </a:lnSpc>
             </a:pPr>
-            <a:fld id="{1CB3025B-DAD9-4AA5-A3B1-2EC6949DF8B4}" type="slidenum">
+            <a:fld id="{B7B738C7-9EAE-4752-ACBC-8CE0A92FAD7F}" type="slidenum">
               <a:rPr b="0" lang="en-US" sz="1800" spc="-1" strike="noStrike">
                 <a:solidFill>
                   <a:srgbClr val="808080"/>
@@ -2578,7 +2578,7 @@
                 <a:spcPct val="100000"/>
               </a:lnSpc>
             </a:pPr>
-            <a:fld id="{06866E45-6634-4378-A4D5-F52E49CC3DC7}" type="slidenum">
+            <a:fld id="{5AF119BF-B896-4CEF-B7D6-0AFADC31BCB8}" type="slidenum">
               <a:rPr b="0" lang="en-US" sz="1800" spc="-1" strike="noStrike">
                 <a:solidFill>
                   <a:srgbClr val="808080"/>
@@ -2762,7 +2762,7 @@
                 <a:spcPct val="100000"/>
               </a:lnSpc>
             </a:pPr>
-            <a:fld id="{9779CA8E-EC89-4763-BB89-83F2254A055D}" type="slidenum">
+            <a:fld id="{B77BD84B-3782-4633-B6D8-B1EC66C669E8}" type="slidenum">
               <a:rPr b="0" lang="en-US" sz="1800" spc="-1" strike="noStrike">
                 <a:solidFill>
                   <a:srgbClr val="808080"/>
@@ -10799,8 +10799,8 @@
         </p:blipFill>
         <p:spPr>
           <a:xfrm>
-            <a:off x="2676600" y="3060000"/>
-            <a:ext cx="6143400" cy="933120"/>
+            <a:off x="540000" y="3240000"/>
+            <a:ext cx="10665720" cy="1620000"/>
           </a:xfrm>
           <a:prstGeom prst="rect">
             <a:avLst/>
@@ -19167,6 +19167,16 @@
                 <a:latin typeface="DejaVu Sans"/>
                 <a:ea typeface="DejaVu Sans"/>
               </a:rPr>
+              <a:t> </a:t>
+            </a:r>
+            <a:r>
+              <a:rPr b="0" lang="en-US" sz="1800" spc="-1" strike="noStrike">
+                <a:solidFill>
+                  <a:srgbClr val="000000"/>
+                </a:solidFill>
+                <a:latin typeface="DejaVu Sans"/>
+                <a:ea typeface="DejaVu Sans"/>
+              </a:rPr>
               <a:t>What is the paper about?</a:t>
             </a:r>
             <a:endParaRPr b="0" lang="en-GB" sz="1800" spc="-1" strike="noStrike">
@@ -19201,6 +19211,16 @@
                 <a:latin typeface="DejaVu Sans"/>
                 <a:ea typeface="DejaVu Sans"/>
               </a:rPr>
+              <a:t> </a:t>
+            </a:r>
+            <a:r>
+              <a:rPr b="0" lang="en-US" sz="1800" spc="-1" strike="noStrike">
+                <a:solidFill>
+                  <a:srgbClr val="000000"/>
+                </a:solidFill>
+                <a:latin typeface="DejaVu Sans"/>
+                <a:ea typeface="DejaVu Sans"/>
+              </a:rPr>
               <a:t>What is the State of the Art?</a:t>
             </a:r>
             <a:endParaRPr b="0" lang="en-GB" sz="1800" spc="-1" strike="noStrike">
@@ -19235,6 +19255,16 @@
                 <a:latin typeface="DejaVu Sans"/>
                 <a:ea typeface="DejaVu Sans"/>
               </a:rPr>
+              <a:t> </a:t>
+            </a:r>
+            <a:r>
+              <a:rPr b="0" lang="en-US" sz="1800" spc="-1" strike="noStrike">
+                <a:solidFill>
+                  <a:srgbClr val="000000"/>
+                </a:solidFill>
+                <a:latin typeface="DejaVu Sans"/>
+                <a:ea typeface="DejaVu Sans"/>
+              </a:rPr>
               <a:t>What is the detected gap?</a:t>
             </a:r>
             <a:endParaRPr b="0" lang="en-GB" sz="1800" spc="-1" strike="noStrike">
@@ -19269,6 +19299,16 @@
                 <a:latin typeface="DejaVu Sans"/>
                 <a:ea typeface="DejaVu Sans"/>
               </a:rPr>
+              <a:t> </a:t>
+            </a:r>
+            <a:r>
+              <a:rPr b="0" lang="en-US" sz="1800" spc="-1" strike="noStrike">
+                <a:solidFill>
+                  <a:srgbClr val="000000"/>
+                </a:solidFill>
+                <a:latin typeface="DejaVu Sans"/>
+                <a:ea typeface="DejaVu Sans"/>
+              </a:rPr>
               <a:t>What are the main questions to be answered pertaining to the gap?</a:t>
             </a:r>
             <a:endParaRPr b="0" lang="en-GB" sz="1800" spc="-1" strike="noStrike">
@@ -19295,6 +19335,16 @@
               <a:buFont typeface="OpenSymbol"/>
               <a:buAutoNum type="arabicParenR"/>
             </a:pPr>
+            <a:r>
+              <a:rPr b="0" lang="en-US" sz="1800" spc="-1" strike="noStrike">
+                <a:solidFill>
+                  <a:srgbClr val="000000"/>
+                </a:solidFill>
+                <a:latin typeface="DejaVu Sans"/>
+                <a:ea typeface="DejaVu Sans"/>
+              </a:rPr>
+              <a:t> </a:t>
+            </a:r>
             <a:r>
               <a:rPr b="0" lang="en-US" sz="1800" spc="-1" strike="noStrike">
                 <a:solidFill>
@@ -19892,59 +19942,29 @@
           </a:p>
         </p:txBody>
       </p:sp>
-      <p:sp>
-        <p:nvSpPr>
-          <p:cNvPr id="307" name=""/>
-          <p:cNvSpPr/>
-          <p:nvPr/>
-        </p:nvSpPr>
-        <p:spPr>
-          <a:xfrm>
-            <a:off x="6480000" y="720000"/>
-            <a:ext cx="835560" cy="345960"/>
-          </a:xfrm>
-          <a:prstGeom prst="rect">
-            <a:avLst/>
-          </a:prstGeom>
-          <a:noFill/>
-          <a:ln w="0">
-            <a:noFill/>
-          </a:ln>
-        </p:spPr>
-        <p:style>
-          <a:lnRef idx="0"/>
-          <a:fillRef idx="0"/>
-          <a:effectRef idx="0"/>
-          <a:fontRef idx="minor"/>
-        </p:style>
-        <p:txBody>
-          <a:bodyPr wrap="none" lIns="90000" rIns="90000" tIns="45000" bIns="45000" anchor="t">
-            <a:noAutofit/>
-          </a:bodyPr>
-          <a:p>
-            <a:pPr>
-              <a:lnSpc>
-                <a:spcPct val="100000"/>
-              </a:lnSpc>
-            </a:pPr>
-            <a:r>
-              <a:rPr b="1" lang="en-GB" sz="1800" spc="-1" strike="noStrike">
-                <a:solidFill>
-                  <a:srgbClr val="ff0000"/>
-                </a:solidFill>
-                <a:latin typeface="Arial"/>
-              </a:rPr>
-              <a:t>TODO</a:t>
-            </a:r>
-            <a:endParaRPr b="0" lang="en-GB" sz="1800" spc="-1" strike="noStrike">
-              <a:solidFill>
-                <a:srgbClr val="000000"/>
-              </a:solidFill>
-              <a:latin typeface="Arial"/>
-            </a:endParaRPr>
-          </a:p>
-        </p:txBody>
-      </p:sp>
+      <p:pic>
+        <p:nvPicPr>
+          <p:cNvPr id="307" name="" descr=""/>
+          <p:cNvPicPr/>
+          <p:nvPr/>
+        </p:nvPicPr>
+        <p:blipFill>
+          <a:blip r:embed="rId1"/>
+          <a:stretch/>
+        </p:blipFill>
+        <p:spPr>
+          <a:xfrm>
+            <a:off x="1740960" y="2160000"/>
+            <a:ext cx="8339040" cy="3600000"/>
+          </a:xfrm>
+          <a:prstGeom prst="rect">
+            <a:avLst/>
+          </a:prstGeom>
+          <a:ln w="0">
+            <a:noFill/>
+          </a:ln>
+        </p:spPr>
+      </p:pic>
     </p:spTree>
   </p:cSld>
   <mc:AlternateContent>
@@ -20173,59 +20193,29 @@
           </a:p>
         </p:txBody>
       </p:sp>
-      <p:sp>
-        <p:nvSpPr>
-          <p:cNvPr id="312" name=""/>
-          <p:cNvSpPr/>
-          <p:nvPr/>
-        </p:nvSpPr>
-        <p:spPr>
-          <a:xfrm>
-            <a:off x="6480000" y="720000"/>
-            <a:ext cx="835560" cy="345960"/>
-          </a:xfrm>
-          <a:prstGeom prst="rect">
-            <a:avLst/>
-          </a:prstGeom>
-          <a:noFill/>
-          <a:ln w="0">
-            <a:noFill/>
-          </a:ln>
-        </p:spPr>
-        <p:style>
-          <a:lnRef idx="0"/>
-          <a:fillRef idx="0"/>
-          <a:effectRef idx="0"/>
-          <a:fontRef idx="minor"/>
-        </p:style>
-        <p:txBody>
-          <a:bodyPr wrap="none" lIns="90000" rIns="90000" tIns="45000" bIns="45000" anchor="t">
-            <a:noAutofit/>
-          </a:bodyPr>
-          <a:p>
-            <a:pPr>
-              <a:lnSpc>
-                <a:spcPct val="100000"/>
-              </a:lnSpc>
-            </a:pPr>
-            <a:r>
-              <a:rPr b="1" lang="en-GB" sz="1800" spc="-1" strike="noStrike">
-                <a:solidFill>
-                  <a:srgbClr val="ff0000"/>
-                </a:solidFill>
-                <a:latin typeface="Arial"/>
-              </a:rPr>
-              <a:t>TODO</a:t>
-            </a:r>
-            <a:endParaRPr b="0" lang="en-GB" sz="1800" spc="-1" strike="noStrike">
-              <a:solidFill>
-                <a:srgbClr val="000000"/>
-              </a:solidFill>
-              <a:latin typeface="Arial"/>
-            </a:endParaRPr>
-          </a:p>
-        </p:txBody>
-      </p:sp>
+      <p:pic>
+        <p:nvPicPr>
+          <p:cNvPr id="312" name="" descr=""/>
+          <p:cNvPicPr/>
+          <p:nvPr/>
+        </p:nvPicPr>
+        <p:blipFill>
+          <a:blip r:embed="rId1"/>
+          <a:stretch/>
+        </p:blipFill>
+        <p:spPr>
+          <a:xfrm>
+            <a:off x="226080" y="2160000"/>
+            <a:ext cx="11653920" cy="4320000"/>
+          </a:xfrm>
+          <a:prstGeom prst="rect">
+            <a:avLst/>
+          </a:prstGeom>
+          <a:ln w="0">
+            <a:noFill/>
+          </a:ln>
+        </p:spPr>
+      </p:pic>
     </p:spTree>
   </p:cSld>
   <mc:AlternateContent>
@@ -22541,44 +22531,25 @@
                 <a:latin typeface="DejaVu Sans"/>
                 <a:ea typeface="DejaVu Sans"/>
               </a:rPr>
-              <a:t>) – Paper  →</a:t>
+              <a:t>) – Paper  → </a:t>
+            </a:r>
+            <a:r>
+              <a:rPr b="0" lang="en-US" sz="1800" spc="-1" strike="noStrike" u="sng">
+                <a:solidFill>
+                  <a:srgbClr val="0000ff"/>
+                </a:solidFill>
+                <a:uFillTx/>
+                <a:latin typeface="DejaVu Sans"/>
+                <a:ea typeface="DejaVu Sans"/>
+                <a:hlinkClick r:id="rId2"/>
+              </a:rPr>
+              <a:t>Link</a:t>
             </a:r>
             <a:r>
               <a:rPr b="0" lang="en-US" sz="1800" spc="-1" strike="noStrike">
                 <a:solidFill>
                   <a:srgbClr val="000000"/>
                 </a:solidFill>
-                <a:highlight>
-                  <a:srgbClr val="ffff00"/>
-                </a:highlight>
-                <a:latin typeface="DejaVu Sans"/>
-                <a:ea typeface="DejaVu Sans"/>
-              </a:rPr>
-              <a:t> </a:t>
-            </a:r>
-            <a:r>
-              <a:rPr b="0" lang="en-US" sz="1800" spc="-1" strike="noStrike" u="sng">
-                <a:solidFill>
-                  <a:srgbClr val="0000ff"/>
-                </a:solidFill>
-                <a:highlight>
-                  <a:srgbClr val="ffff00"/>
-                </a:highlight>
-                <a:uFillTx/>
-                <a:latin typeface="DejaVu Sans"/>
-                <a:ea typeface="DejaVu Sans"/>
-                <a:hlinkClick r:id="rId2"/>
-              </a:rPr>
-              <a:t>Link</a:t>
-            </a:r>
-            <a:r>
-              <a:rPr b="0" lang="en-US" sz="1800" spc="-1" strike="noStrike">
-                <a:solidFill>
-                  <a:srgbClr val="000000"/>
-                </a:solidFill>
-                <a:highlight>
-                  <a:srgbClr val="ffff00"/>
-                </a:highlight>
                 <a:latin typeface="DejaVu Sans"/>
                 <a:ea typeface="DejaVu Sans"/>
               </a:rPr>
@@ -22842,59 +22813,6 @@
               <a:t>Templates</a:t>
             </a:r>
             <a:endParaRPr b="0" lang="en-GB" sz="2200" spc="-1" strike="noStrike">
-              <a:solidFill>
-                <a:srgbClr val="000000"/>
-              </a:solidFill>
-              <a:latin typeface="Arial"/>
-            </a:endParaRPr>
-          </a:p>
-        </p:txBody>
-      </p:sp>
-      <p:sp>
-        <p:nvSpPr>
-          <p:cNvPr id="334" name=""/>
-          <p:cNvSpPr/>
-          <p:nvPr/>
-        </p:nvSpPr>
-        <p:spPr>
-          <a:xfrm>
-            <a:off x="6480000" y="720000"/>
-            <a:ext cx="835560" cy="345960"/>
-          </a:xfrm>
-          <a:prstGeom prst="rect">
-            <a:avLst/>
-          </a:prstGeom>
-          <a:noFill/>
-          <a:ln w="0">
-            <a:noFill/>
-          </a:ln>
-        </p:spPr>
-        <p:style>
-          <a:lnRef idx="0"/>
-          <a:fillRef idx="0"/>
-          <a:effectRef idx="0"/>
-          <a:fontRef idx="minor"/>
-        </p:style>
-        <p:txBody>
-          <a:bodyPr wrap="none" lIns="90000" rIns="90000" tIns="45000" bIns="45000" anchor="t">
-            <a:noAutofit/>
-          </a:bodyPr>
-          <a:p>
-            <a:pPr>
-              <a:lnSpc>
-                <a:spcPct val="100000"/>
-              </a:lnSpc>
-            </a:pPr>
-            <a:r>
-              <a:rPr b="1" lang="en-GB" sz="1800" spc="-1" strike="noStrike">
-                <a:solidFill>
-                  <a:srgbClr val="ff0000"/>
-                </a:solidFill>
-                <a:latin typeface="Arial"/>
-              </a:rPr>
-              <a:t>TODO</a:t>
-            </a:r>
-            <a:endParaRPr b="0" lang="en-GB" sz="1800" spc="-1" strike="noStrike">
               <a:solidFill>
                 <a:srgbClr val="000000"/>
               </a:solidFill>
@@ -22935,7 +22853,7 @@
       </p:grpSpPr>
       <p:sp>
         <p:nvSpPr>
-          <p:cNvPr id="335" name="CustomShape 189"/>
+          <p:cNvPr id="334" name="CustomShape 189"/>
           <p:cNvSpPr/>
           <p:nvPr/>
         </p:nvSpPr>
@@ -22989,7 +22907,7 @@
       </p:sp>
       <p:sp>
         <p:nvSpPr>
-          <p:cNvPr id="336" name="CustomShape 190"/>
+          <p:cNvPr id="335" name="CustomShape 190"/>
           <p:cNvSpPr/>
           <p:nvPr/>
         </p:nvSpPr>
@@ -23168,7 +23086,7 @@
       </p:sp>
       <p:sp>
         <p:nvSpPr>
-          <p:cNvPr id="337" name="CustomShape 191"/>
+          <p:cNvPr id="336" name="CustomShape 191"/>
           <p:cNvSpPr/>
           <p:nvPr/>
         </p:nvSpPr>
@@ -23252,7 +23170,7 @@
       </p:grpSpPr>
       <p:sp>
         <p:nvSpPr>
-          <p:cNvPr id="338" name="CustomShape 160"/>
+          <p:cNvPr id="337" name="CustomShape 160"/>
           <p:cNvSpPr/>
           <p:nvPr/>
         </p:nvSpPr>
@@ -23306,7 +23224,7 @@
       </p:sp>
       <p:sp>
         <p:nvSpPr>
-          <p:cNvPr id="339" name="CustomShape 168"/>
+          <p:cNvPr id="338" name="CustomShape 168"/>
           <p:cNvSpPr/>
           <p:nvPr/>
         </p:nvSpPr>
@@ -23351,7 +23269,7 @@
       </p:sp>
       <p:sp>
         <p:nvSpPr>
-          <p:cNvPr id="340" name="CustomShape 169"/>
+          <p:cNvPr id="339" name="CustomShape 169"/>
           <p:cNvSpPr/>
           <p:nvPr/>
         </p:nvSpPr>
@@ -23396,7 +23314,7 @@
       </p:sp>
       <p:sp>
         <p:nvSpPr>
-          <p:cNvPr id="341" name="CustomShape 170"/>
+          <p:cNvPr id="340" name="CustomShape 170"/>
           <p:cNvSpPr/>
           <p:nvPr/>
         </p:nvSpPr>
@@ -23450,7 +23368,7 @@
       </p:sp>
       <p:sp>
         <p:nvSpPr>
-          <p:cNvPr id="342" name="CustomShape 172"/>
+          <p:cNvPr id="341" name="CustomShape 172"/>
           <p:cNvSpPr/>
           <p:nvPr/>
         </p:nvSpPr>
@@ -23578,7 +23496,7 @@
       </p:grpSpPr>
       <p:sp>
         <p:nvSpPr>
-          <p:cNvPr id="343" name="CustomShape 148"/>
+          <p:cNvPr id="342" name="CustomShape 148"/>
           <p:cNvSpPr/>
           <p:nvPr/>
         </p:nvSpPr>
@@ -23632,7 +23550,7 @@
       </p:sp>
       <p:sp>
         <p:nvSpPr>
-          <p:cNvPr id="344" name="CustomShape 149"/>
+          <p:cNvPr id="343" name="CustomShape 149"/>
           <p:cNvSpPr/>
           <p:nvPr/>
         </p:nvSpPr>
@@ -23811,7 +23729,7 @@
       </p:sp>
       <p:sp>
         <p:nvSpPr>
-          <p:cNvPr id="345" name="CustomShape 192"/>
+          <p:cNvPr id="344" name="CustomShape 192"/>
           <p:cNvSpPr/>
           <p:nvPr/>
         </p:nvSpPr>
@@ -23895,7 +23813,7 @@
       </p:grpSpPr>
       <p:sp>
         <p:nvSpPr>
-          <p:cNvPr id="346" name="CustomShape 1"/>
+          <p:cNvPr id="345" name="CustomShape 1"/>
           <p:cNvSpPr/>
           <p:nvPr/>
         </p:nvSpPr>
@@ -23955,7 +23873,7 @@
       </p:sp>
       <p:sp>
         <p:nvSpPr>
-          <p:cNvPr id="347" name="CustomShape 2"/>
+          <p:cNvPr id="346" name="CustomShape 2"/>
           <p:cNvSpPr/>
           <p:nvPr/>
         </p:nvSpPr>

</xml_diff>